<commit_message>
include sequence diagrams and STC
</commit_message>
<xml_diff>
--- a/doc/Group 2 Library Management System.pptx
+++ b/doc/Group 2 Library Management System.pptx
@@ -112,6 +112,11 @@
       </a:defRPr>
     </a:lvl9pPr>
   </p:defaultTextStyle>
+  <p:extLst>
+    <p:ext uri="{EFAFB233-063F-42B5-8137-9DF3F51BA10A}">
+      <p15:sldGuideLst xmlns:p15="http://schemas.microsoft.com/office/powerpoint/2012/main"/>
+    </p:ext>
+  </p:extLst>
 </p:presentation>
 </file>
 
@@ -304,7 +309,7 @@
             <a:fld id="{B61BEF0D-F0BB-DE4B-95CE-6DB70DBA9567}" type="datetimeFigureOut">
               <a:rPr lang="en-US" dirty="0"/>
               <a:pPr/>
-              <a:t>9/13/2024</a:t>
+              <a:t>9/14/2024</a:t>
             </a:fld>
             <a:endParaRPr lang="en-US" dirty="0"/>
           </a:p>
@@ -639,7 +644,7 @@
             <a:fld id="{B61BEF0D-F0BB-DE4B-95CE-6DB70DBA9567}" type="datetimeFigureOut">
               <a:rPr lang="en-US" dirty="0"/>
               <a:pPr/>
-              <a:t>9/13/2024</a:t>
+              <a:t>9/14/2024</a:t>
             </a:fld>
             <a:endParaRPr lang="en-US" dirty="0"/>
           </a:p>
@@ -1037,7 +1042,7 @@
             <a:fld id="{B61BEF0D-F0BB-DE4B-95CE-6DB70DBA9567}" type="datetimeFigureOut">
               <a:rPr lang="en-US" dirty="0"/>
               <a:pPr/>
-              <a:t>9/13/2024</a:t>
+              <a:t>9/14/2024</a:t>
             </a:fld>
             <a:endParaRPr lang="en-US" dirty="0"/>
           </a:p>
@@ -1370,7 +1375,7 @@
             <a:fld id="{B61BEF0D-F0BB-DE4B-95CE-6DB70DBA9567}" type="datetimeFigureOut">
               <a:rPr lang="en-US" dirty="0"/>
               <a:pPr/>
-              <a:t>9/13/2024</a:t>
+              <a:t>9/14/2024</a:t>
             </a:fld>
             <a:endParaRPr lang="en-US" dirty="0"/>
           </a:p>
@@ -1687,7 +1692,7 @@
             <a:fld id="{B61BEF0D-F0BB-DE4B-95CE-6DB70DBA9567}" type="datetimeFigureOut">
               <a:rPr lang="en-US" dirty="0"/>
               <a:pPr/>
-              <a:t>9/13/2024</a:t>
+              <a:t>9/14/2024</a:t>
             </a:fld>
             <a:endParaRPr lang="en-US" dirty="0"/>
           </a:p>
@@ -2080,7 +2085,7 @@
             <a:fld id="{B61BEF0D-F0BB-DE4B-95CE-6DB70DBA9567}" type="datetimeFigureOut">
               <a:rPr lang="en-US" dirty="0"/>
               <a:pPr/>
-              <a:t>9/13/2024</a:t>
+              <a:t>9/14/2024</a:t>
             </a:fld>
             <a:endParaRPr lang="en-US" dirty="0"/>
           </a:p>
@@ -2334,7 +2339,7 @@
             <a:fld id="{B61BEF0D-F0BB-DE4B-95CE-6DB70DBA9567}" type="datetimeFigureOut">
               <a:rPr lang="en-US" dirty="0"/>
               <a:pPr/>
-              <a:t>9/13/2024</a:t>
+              <a:t>9/14/2024</a:t>
             </a:fld>
             <a:endParaRPr lang="en-US" dirty="0"/>
           </a:p>
@@ -2593,7 +2598,7 @@
             <a:fld id="{B61BEF0D-F0BB-DE4B-95CE-6DB70DBA9567}" type="datetimeFigureOut">
               <a:rPr lang="en-US" dirty="0"/>
               <a:pPr/>
-              <a:t>9/13/2024</a:t>
+              <a:t>9/14/2024</a:t>
             </a:fld>
             <a:endParaRPr lang="en-US" dirty="0"/>
           </a:p>
@@ -2852,7 +2857,7 @@
             <a:fld id="{B61BEF0D-F0BB-DE4B-95CE-6DB70DBA9567}" type="datetimeFigureOut">
               <a:rPr lang="en-US" dirty="0"/>
               <a:pPr/>
-              <a:t>9/13/2024</a:t>
+              <a:t>9/14/2024</a:t>
             </a:fld>
             <a:endParaRPr lang="en-US" dirty="0"/>
           </a:p>
@@ -3178,7 +3183,7 @@
             <a:fld id="{B61BEF0D-F0BB-DE4B-95CE-6DB70DBA9567}" type="datetimeFigureOut">
               <a:rPr lang="en-US" dirty="0"/>
               <a:pPr/>
-              <a:t>9/13/2024</a:t>
+              <a:t>9/14/2024</a:t>
             </a:fld>
             <a:endParaRPr lang="en-US" dirty="0"/>
           </a:p>
@@ -3498,7 +3503,7 @@
             <a:fld id="{B61BEF0D-F0BB-DE4B-95CE-6DB70DBA9567}" type="datetimeFigureOut">
               <a:rPr lang="en-US" dirty="0"/>
               <a:pPr/>
-              <a:t>9/13/2024</a:t>
+              <a:t>9/14/2024</a:t>
             </a:fld>
             <a:endParaRPr lang="en-US" dirty="0"/>
           </a:p>
@@ -3952,7 +3957,7 @@
             <a:fld id="{B61BEF0D-F0BB-DE4B-95CE-6DB70DBA9567}" type="datetimeFigureOut">
               <a:rPr lang="en-US" dirty="0"/>
               <a:pPr/>
-              <a:t>9/13/2024</a:t>
+              <a:t>9/14/2024</a:t>
             </a:fld>
             <a:endParaRPr lang="en-US" dirty="0"/>
           </a:p>
@@ -4154,7 +4159,7 @@
             <a:fld id="{B61BEF0D-F0BB-DE4B-95CE-6DB70DBA9567}" type="datetimeFigureOut">
               <a:rPr lang="en-US" dirty="0"/>
               <a:pPr/>
-              <a:t>9/13/2024</a:t>
+              <a:t>9/14/2024</a:t>
             </a:fld>
             <a:endParaRPr lang="en-US" dirty="0"/>
           </a:p>
@@ -4328,7 +4333,7 @@
             <a:fld id="{B61BEF0D-F0BB-DE4B-95CE-6DB70DBA9567}" type="datetimeFigureOut">
               <a:rPr lang="en-US" dirty="0"/>
               <a:pPr/>
-              <a:t>9/13/2024</a:t>
+              <a:t>9/14/2024</a:t>
             </a:fld>
             <a:endParaRPr lang="en-US" dirty="0"/>
           </a:p>
@@ -4658,7 +4663,7 @@
             <a:fld id="{B61BEF0D-F0BB-DE4B-95CE-6DB70DBA9567}" type="datetimeFigureOut">
               <a:rPr lang="en-US" dirty="0"/>
               <a:pPr/>
-              <a:t>9/13/2024</a:t>
+              <a:t>9/14/2024</a:t>
             </a:fld>
             <a:endParaRPr lang="en-US" dirty="0"/>
           </a:p>
@@ -5000,7 +5005,7 @@
             <a:fld id="{B61BEF0D-F0BB-DE4B-95CE-6DB70DBA9567}" type="datetimeFigureOut">
               <a:rPr lang="en-US" dirty="0"/>
               <a:pPr/>
-              <a:t>9/13/2024</a:t>
+              <a:t>9/14/2024</a:t>
             </a:fld>
             <a:endParaRPr lang="en-US" dirty="0"/>
           </a:p>
@@ -7114,7 +7119,7 @@
             <a:fld id="{B61BEF0D-F0BB-DE4B-95CE-6DB70DBA9567}" type="datetimeFigureOut">
               <a:rPr lang="en-US" dirty="0"/>
               <a:pPr/>
-              <a:t>9/13/2024</a:t>
+              <a:t>9/14/2024</a:t>
             </a:fld>
             <a:endParaRPr lang="en-US" dirty="0"/>
           </a:p>
@@ -8384,7 +8389,12 @@
             <p:ph type="title"/>
           </p:nvPr>
         </p:nvSpPr>
-        <p:spPr/>
+        <p:spPr>
+          <a:xfrm>
+            <a:off x="2589212" y="5939666"/>
+            <a:ext cx="8915400" cy="566738"/>
+          </a:xfrm>
+        </p:spPr>
         <p:txBody>
           <a:bodyPr/>
           <a:lstStyle/>
@@ -8432,6 +8442,36 @@
           </a:p>
         </p:txBody>
       </p:sp>
+      <p:pic>
+        <p:nvPicPr>
+          <p:cNvPr id="4" name="Imagen 3" descr="Diagrama&#10;&#10;Descripción generada automáticamente con confianza media">
+            <a:extLst>
+              <a:ext uri="{FF2B5EF4-FFF2-40B4-BE49-F238E27FC236}">
+                <a16:creationId xmlns:a16="http://schemas.microsoft.com/office/drawing/2014/main" id="{2BB8A5CC-0EF7-59B8-4B83-7201B77BA48E}"/>
+              </a:ext>
+            </a:extLst>
+          </p:cNvPr>
+          <p:cNvPicPr>
+            <a:picLocks noChangeAspect="1"/>
+          </p:cNvPicPr>
+          <p:nvPr/>
+        </p:nvPicPr>
+        <p:blipFill>
+          <a:blip r:embed="rId2"/>
+          <a:stretch>
+            <a:fillRect/>
+          </a:stretch>
+        </p:blipFill>
+        <p:spPr>
+          <a:xfrm>
+            <a:off x="1817718" y="0"/>
+            <a:ext cx="8987041" cy="5939666"/>
+          </a:xfrm>
+          <a:prstGeom prst="rect">
+            <a:avLst/>
+          </a:prstGeom>
+        </p:spPr>
+      </p:pic>
     </p:spTree>
     <p:extLst>
       <p:ext uri="{BB962C8B-B14F-4D97-AF65-F5344CB8AC3E}">
@@ -8478,7 +8518,12 @@
             <p:ph type="title"/>
           </p:nvPr>
         </p:nvSpPr>
-        <p:spPr/>
+        <p:spPr>
+          <a:xfrm>
+            <a:off x="2589212" y="5656297"/>
+            <a:ext cx="8915400" cy="566738"/>
+          </a:xfrm>
+        </p:spPr>
         <p:txBody>
           <a:bodyPr/>
           <a:lstStyle/>
@@ -8526,6 +8571,36 @@
           </a:p>
         </p:txBody>
       </p:sp>
+      <p:pic>
+        <p:nvPicPr>
+          <p:cNvPr id="8" name="Imagen 7" descr="Diagrama&#10;&#10;Descripción generada automáticamente">
+            <a:extLst>
+              <a:ext uri="{FF2B5EF4-FFF2-40B4-BE49-F238E27FC236}">
+                <a16:creationId xmlns:a16="http://schemas.microsoft.com/office/drawing/2014/main" id="{4F117968-DF52-A85E-C24E-03BFD543FBAD}"/>
+              </a:ext>
+            </a:extLst>
+          </p:cNvPr>
+          <p:cNvPicPr>
+            <a:picLocks noChangeAspect="1"/>
+          </p:cNvPicPr>
+          <p:nvPr/>
+        </p:nvPicPr>
+        <p:blipFill>
+          <a:blip r:embed="rId2"/>
+          <a:stretch>
+            <a:fillRect/>
+          </a:stretch>
+        </p:blipFill>
+        <p:spPr>
+          <a:xfrm>
+            <a:off x="1552340" y="0"/>
+            <a:ext cx="7607158" cy="5673134"/>
+          </a:xfrm>
+          <a:prstGeom prst="rect">
+            <a:avLst/>
+          </a:prstGeom>
+        </p:spPr>
+      </p:pic>
     </p:spTree>
     <p:extLst>
       <p:ext uri="{BB962C8B-B14F-4D97-AF65-F5344CB8AC3E}">
@@ -8749,26 +8824,297 @@
           <a:lstStyle/>
           <a:p>
             <a:r>
-              <a:rPr lang="es-CO" dirty="0" err="1"/>
-              <a:t>Conclusion</a:t>
-            </a:r>
-            <a:r>
-              <a:rPr lang="es-CO" dirty="0"/>
-              <a:t> </a:t>
-            </a:r>
-            <a:r>
-              <a:rPr lang="es-CO" dirty="0" err="1"/>
-              <a:t>with</a:t>
-            </a:r>
-            <a:r>
-              <a:rPr lang="es-CO" dirty="0"/>
-              <a:t> STC </a:t>
-            </a:r>
-            <a:r>
-              <a:rPr lang="es-CO" dirty="0" err="1"/>
-              <a:t>Knowledge</a:t>
-            </a:r>
-            <a:endParaRPr lang="es-CO" dirty="0"/>
+              <a:rPr lang="en-US" dirty="0"/>
+              <a:t>Conclusion with STC Knowledge</a:t>
+            </a:r>
+          </a:p>
+        </p:txBody>
+      </p:sp>
+      <p:sp>
+        <p:nvSpPr>
+          <p:cNvPr id="4" name="CuadroTexto 3">
+            <a:extLst>
+              <a:ext uri="{FF2B5EF4-FFF2-40B4-BE49-F238E27FC236}">
+                <a16:creationId xmlns:a16="http://schemas.microsoft.com/office/drawing/2014/main" id="{73843ED1-A265-B399-96C7-DAE8AC2779C1}"/>
+              </a:ext>
+            </a:extLst>
+          </p:cNvPr>
+          <p:cNvSpPr txBox="1"/>
+          <p:nvPr/>
+        </p:nvSpPr>
+        <p:spPr>
+          <a:xfrm>
+            <a:off x="7482371" y="4456409"/>
+            <a:ext cx="3977995" cy="1477328"/>
+          </a:xfrm>
+          <a:prstGeom prst="rect">
+            <a:avLst/>
+          </a:prstGeom>
+          <a:noFill/>
+          <a:effectLst>
+            <a:softEdge rad="127000"/>
+          </a:effectLst>
+          <a:scene3d>
+            <a:camera prst="orthographicFront"/>
+            <a:lightRig rig="threePt" dir="t"/>
+          </a:scene3d>
+          <a:sp3d contourW="25400" prstMaterial="softEdge">
+            <a:bevelT prst="slope"/>
+            <a:contourClr>
+              <a:schemeClr val="accent6">
+                <a:lumMod val="75000"/>
+              </a:schemeClr>
+            </a:contourClr>
+          </a:sp3d>
+        </p:spPr>
+        <p:txBody>
+          <a:bodyPr wrap="square">
+            <a:spAutoFit/>
+          </a:bodyPr>
+          <a:lstStyle/>
+          <a:p>
+            <a:r>
+              <a:rPr lang="en-US" b="1" dirty="0"/>
+              <a:t>The field of all possibilities is the source of all the solutions: </a:t>
+            </a:r>
+            <a:r>
+              <a:rPr lang="en-US" dirty="0"/>
+              <a:t>There are many ways of solving the same problem; so, don’t be afraid of trying one new</a:t>
+            </a:r>
+          </a:p>
+        </p:txBody>
+      </p:sp>
+      <p:sp>
+        <p:nvSpPr>
+          <p:cNvPr id="7" name="CuadroTexto 6">
+            <a:extLst>
+              <a:ext uri="{FF2B5EF4-FFF2-40B4-BE49-F238E27FC236}">
+                <a16:creationId xmlns:a16="http://schemas.microsoft.com/office/drawing/2014/main" id="{E4CDE019-933B-E4DB-BA1F-AE5FE2FC8346}"/>
+              </a:ext>
+            </a:extLst>
+          </p:cNvPr>
+          <p:cNvSpPr txBox="1"/>
+          <p:nvPr/>
+        </p:nvSpPr>
+        <p:spPr>
+          <a:xfrm>
+            <a:off x="893508" y="4456409"/>
+            <a:ext cx="6098458" cy="1477328"/>
+          </a:xfrm>
+          <a:prstGeom prst="rect">
+            <a:avLst/>
+          </a:prstGeom>
+          <a:noFill/>
+          <a:effectLst>
+            <a:softEdge rad="127000"/>
+          </a:effectLst>
+          <a:scene3d>
+            <a:camera prst="orthographicFront"/>
+            <a:lightRig rig="threePt" dir="t"/>
+          </a:scene3d>
+          <a:sp3d contourW="25400" prstMaterial="softEdge">
+            <a:bevelT prst="slope"/>
+            <a:contourClr>
+              <a:schemeClr val="accent6">
+                <a:lumMod val="75000"/>
+              </a:schemeClr>
+            </a:contourClr>
+          </a:sp3d>
+        </p:spPr>
+        <p:txBody>
+          <a:bodyPr wrap="square">
+            <a:spAutoFit/>
+          </a:bodyPr>
+          <a:lstStyle>
+            <a:defPPr>
+              <a:defRPr lang="en-US"/>
+            </a:defPPr>
+            <a:lvl1pPr>
+              <a:defRPr b="1"/>
+            </a:lvl1pPr>
+          </a:lstStyle>
+          <a:p>
+            <a:r>
+              <a:rPr lang="en-US" dirty="0"/>
+              <a:t>Harmony exists in diversity: </a:t>
+            </a:r>
+            <a:r>
+              <a:rPr lang="en-US" b="0" dirty="0"/>
+              <a:t>in a group of three people from different continents, diversity shows three different ways of seeing the same problem, but harmony makes the final product achieves all the expectations. </a:t>
+            </a:r>
+          </a:p>
+        </p:txBody>
+      </p:sp>
+      <p:sp>
+        <p:nvSpPr>
+          <p:cNvPr id="9" name="CuadroTexto 8">
+            <a:extLst>
+              <a:ext uri="{FF2B5EF4-FFF2-40B4-BE49-F238E27FC236}">
+                <a16:creationId xmlns:a16="http://schemas.microsoft.com/office/drawing/2014/main" id="{17121209-BFD7-E3B3-5514-523FF52F2099}"/>
+              </a:ext>
+            </a:extLst>
+          </p:cNvPr>
+          <p:cNvSpPr txBox="1"/>
+          <p:nvPr/>
+        </p:nvSpPr>
+        <p:spPr>
+          <a:xfrm>
+            <a:off x="7482371" y="2246248"/>
+            <a:ext cx="3977995" cy="1477328"/>
+          </a:xfrm>
+          <a:prstGeom prst="rect">
+            <a:avLst/>
+          </a:prstGeom>
+          <a:noFill/>
+          <a:effectLst>
+            <a:softEdge rad="127000"/>
+          </a:effectLst>
+          <a:scene3d>
+            <a:camera prst="orthographicFront"/>
+            <a:lightRig rig="threePt" dir="t"/>
+          </a:scene3d>
+          <a:sp3d contourW="25400" prstMaterial="softEdge">
+            <a:bevelT prst="slope"/>
+            <a:contourClr>
+              <a:schemeClr val="accent6">
+                <a:lumMod val="75000"/>
+              </a:schemeClr>
+            </a:contourClr>
+          </a:sp3d>
+        </p:spPr>
+        <p:txBody>
+          <a:bodyPr wrap="square">
+            <a:spAutoFit/>
+          </a:bodyPr>
+          <a:lstStyle>
+            <a:defPPr>
+              <a:defRPr lang="en-US"/>
+            </a:defPPr>
+            <a:lvl1pPr>
+              <a:defRPr b="0"/>
+            </a:lvl1pPr>
+          </a:lstStyle>
+          <a:p>
+            <a:r>
+              <a:rPr lang="en-US" b="1" dirty="0"/>
+              <a:t>Rest and Activity are the steps of progress: </a:t>
+            </a:r>
+            <a:r>
+              <a:rPr lang="en-US" dirty="0"/>
+              <a:t>the best way to </a:t>
+            </a:r>
+            <a:r>
+              <a:rPr lang="en-US" dirty="0" err="1"/>
+              <a:t>achive</a:t>
+            </a:r>
+            <a:r>
+              <a:rPr lang="en-US" dirty="0"/>
+              <a:t> goals as a team is to define </a:t>
+            </a:r>
+            <a:r>
+              <a:rPr lang="en-US" dirty="0" err="1"/>
+              <a:t>propper</a:t>
+            </a:r>
+            <a:r>
+              <a:rPr lang="en-US" dirty="0"/>
+              <a:t> times to work, rest and personal things. </a:t>
+            </a:r>
+          </a:p>
+        </p:txBody>
+      </p:sp>
+      <p:sp>
+        <p:nvSpPr>
+          <p:cNvPr id="10" name="CuadroTexto 9">
+            <a:extLst>
+              <a:ext uri="{FF2B5EF4-FFF2-40B4-BE49-F238E27FC236}">
+                <a16:creationId xmlns:a16="http://schemas.microsoft.com/office/drawing/2014/main" id="{8295BAF3-8746-15D1-2A28-98E424A7082D}"/>
+              </a:ext>
+            </a:extLst>
+          </p:cNvPr>
+          <p:cNvSpPr txBox="1"/>
+          <p:nvPr/>
+        </p:nvSpPr>
+        <p:spPr>
+          <a:xfrm>
+            <a:off x="893508" y="2246248"/>
+            <a:ext cx="5979242" cy="1477328"/>
+          </a:xfrm>
+          <a:prstGeom prst="rect">
+            <a:avLst/>
+          </a:prstGeom>
+          <a:noFill/>
+          <a:effectLst>
+            <a:softEdge rad="127000"/>
+          </a:effectLst>
+          <a:scene3d>
+            <a:camera prst="orthographicFront"/>
+            <a:lightRig rig="threePt" dir="t"/>
+          </a:scene3d>
+          <a:sp3d contourW="25400" prstMaterial="softEdge">
+            <a:bevelT prst="slope"/>
+            <a:contourClr>
+              <a:schemeClr val="accent6">
+                <a:lumMod val="75000"/>
+              </a:schemeClr>
+            </a:contourClr>
+          </a:sp3d>
+        </p:spPr>
+        <p:txBody>
+          <a:bodyPr wrap="square">
+            <a:spAutoFit/>
+          </a:bodyPr>
+          <a:lstStyle>
+            <a:defPPr>
+              <a:defRPr lang="en-US"/>
+            </a:defPPr>
+            <a:lvl1pPr>
+              <a:defRPr b="0"/>
+            </a:lvl1pPr>
+          </a:lstStyle>
+          <a:p>
+            <a:r>
+              <a:rPr lang="en-US" b="1" dirty="0"/>
+              <a:t>Inner is the bases of the outer:  </a:t>
+            </a:r>
+            <a:r>
+              <a:rPr lang="en-US" dirty="0"/>
+              <a:t>A well-defined  object-oriented design begins by modeling the business from inside by identifying its main objects and their properties, before using them in in concrete and visible programs.</a:t>
+            </a:r>
+          </a:p>
+        </p:txBody>
+      </p:sp>
+      <p:sp>
+        <p:nvSpPr>
+          <p:cNvPr id="11" name="CuadroTexto 10">
+            <a:extLst>
+              <a:ext uri="{FF2B5EF4-FFF2-40B4-BE49-F238E27FC236}">
+                <a16:creationId xmlns:a16="http://schemas.microsoft.com/office/drawing/2014/main" id="{95E3DF03-7C94-B875-CAC7-8B46F3CE30E8}"/>
+              </a:ext>
+            </a:extLst>
+          </p:cNvPr>
+          <p:cNvSpPr txBox="1"/>
+          <p:nvPr/>
+        </p:nvSpPr>
+        <p:spPr>
+          <a:xfrm>
+            <a:off x="1689920" y="1387635"/>
+            <a:ext cx="8766686" cy="646331"/>
+          </a:xfrm>
+          <a:prstGeom prst="rect">
+            <a:avLst/>
+          </a:prstGeom>
+          <a:noFill/>
+        </p:spPr>
+        <p:txBody>
+          <a:bodyPr wrap="square">
+            <a:spAutoFit/>
+          </a:bodyPr>
+          <a:lstStyle/>
+          <a:p>
+            <a:r>
+              <a:rPr lang="en-US" dirty="0"/>
+              <a:t>This is the way that STC’s principles are related with Modern programming practices:</a:t>
+            </a:r>
           </a:p>
         </p:txBody>
       </p:sp>

</xml_diff>

<commit_message>
include class diagrams and second version of sequence's
</commit_message>
<xml_diff>
--- a/doc/Group 2 Library Management System.pptx
+++ b/doc/Group 2 Library Management System.pptx
@@ -309,7 +309,7 @@
             <a:fld id="{B61BEF0D-F0BB-DE4B-95CE-6DB70DBA9567}" type="datetimeFigureOut">
               <a:rPr lang="en-US" dirty="0"/>
               <a:pPr/>
-              <a:t>9/14/2024</a:t>
+              <a:t>9/15/2024</a:t>
             </a:fld>
             <a:endParaRPr lang="en-US" dirty="0"/>
           </a:p>
@@ -644,7 +644,7 @@
             <a:fld id="{B61BEF0D-F0BB-DE4B-95CE-6DB70DBA9567}" type="datetimeFigureOut">
               <a:rPr lang="en-US" dirty="0"/>
               <a:pPr/>
-              <a:t>9/14/2024</a:t>
+              <a:t>9/15/2024</a:t>
             </a:fld>
             <a:endParaRPr lang="en-US" dirty="0"/>
           </a:p>
@@ -1042,7 +1042,7 @@
             <a:fld id="{B61BEF0D-F0BB-DE4B-95CE-6DB70DBA9567}" type="datetimeFigureOut">
               <a:rPr lang="en-US" dirty="0"/>
               <a:pPr/>
-              <a:t>9/14/2024</a:t>
+              <a:t>9/15/2024</a:t>
             </a:fld>
             <a:endParaRPr lang="en-US" dirty="0"/>
           </a:p>
@@ -1375,7 +1375,7 @@
             <a:fld id="{B61BEF0D-F0BB-DE4B-95CE-6DB70DBA9567}" type="datetimeFigureOut">
               <a:rPr lang="en-US" dirty="0"/>
               <a:pPr/>
-              <a:t>9/14/2024</a:t>
+              <a:t>9/15/2024</a:t>
             </a:fld>
             <a:endParaRPr lang="en-US" dirty="0"/>
           </a:p>
@@ -1692,7 +1692,7 @@
             <a:fld id="{B61BEF0D-F0BB-DE4B-95CE-6DB70DBA9567}" type="datetimeFigureOut">
               <a:rPr lang="en-US" dirty="0"/>
               <a:pPr/>
-              <a:t>9/14/2024</a:t>
+              <a:t>9/15/2024</a:t>
             </a:fld>
             <a:endParaRPr lang="en-US" dirty="0"/>
           </a:p>
@@ -2085,7 +2085,7 @@
             <a:fld id="{B61BEF0D-F0BB-DE4B-95CE-6DB70DBA9567}" type="datetimeFigureOut">
               <a:rPr lang="en-US" dirty="0"/>
               <a:pPr/>
-              <a:t>9/14/2024</a:t>
+              <a:t>9/15/2024</a:t>
             </a:fld>
             <a:endParaRPr lang="en-US" dirty="0"/>
           </a:p>
@@ -2339,7 +2339,7 @@
             <a:fld id="{B61BEF0D-F0BB-DE4B-95CE-6DB70DBA9567}" type="datetimeFigureOut">
               <a:rPr lang="en-US" dirty="0"/>
               <a:pPr/>
-              <a:t>9/14/2024</a:t>
+              <a:t>9/15/2024</a:t>
             </a:fld>
             <a:endParaRPr lang="en-US" dirty="0"/>
           </a:p>
@@ -2598,7 +2598,7 @@
             <a:fld id="{B61BEF0D-F0BB-DE4B-95CE-6DB70DBA9567}" type="datetimeFigureOut">
               <a:rPr lang="en-US" dirty="0"/>
               <a:pPr/>
-              <a:t>9/14/2024</a:t>
+              <a:t>9/15/2024</a:t>
             </a:fld>
             <a:endParaRPr lang="en-US" dirty="0"/>
           </a:p>
@@ -2857,7 +2857,7 @@
             <a:fld id="{B61BEF0D-F0BB-DE4B-95CE-6DB70DBA9567}" type="datetimeFigureOut">
               <a:rPr lang="en-US" dirty="0"/>
               <a:pPr/>
-              <a:t>9/14/2024</a:t>
+              <a:t>9/15/2024</a:t>
             </a:fld>
             <a:endParaRPr lang="en-US" dirty="0"/>
           </a:p>
@@ -3183,7 +3183,7 @@
             <a:fld id="{B61BEF0D-F0BB-DE4B-95CE-6DB70DBA9567}" type="datetimeFigureOut">
               <a:rPr lang="en-US" dirty="0"/>
               <a:pPr/>
-              <a:t>9/14/2024</a:t>
+              <a:t>9/15/2024</a:t>
             </a:fld>
             <a:endParaRPr lang="en-US" dirty="0"/>
           </a:p>
@@ -3503,7 +3503,7 @@
             <a:fld id="{B61BEF0D-F0BB-DE4B-95CE-6DB70DBA9567}" type="datetimeFigureOut">
               <a:rPr lang="en-US" dirty="0"/>
               <a:pPr/>
-              <a:t>9/14/2024</a:t>
+              <a:t>9/15/2024</a:t>
             </a:fld>
             <a:endParaRPr lang="en-US" dirty="0"/>
           </a:p>
@@ -3957,7 +3957,7 @@
             <a:fld id="{B61BEF0D-F0BB-DE4B-95CE-6DB70DBA9567}" type="datetimeFigureOut">
               <a:rPr lang="en-US" dirty="0"/>
               <a:pPr/>
-              <a:t>9/14/2024</a:t>
+              <a:t>9/15/2024</a:t>
             </a:fld>
             <a:endParaRPr lang="en-US" dirty="0"/>
           </a:p>
@@ -4159,7 +4159,7 @@
             <a:fld id="{B61BEF0D-F0BB-DE4B-95CE-6DB70DBA9567}" type="datetimeFigureOut">
               <a:rPr lang="en-US" dirty="0"/>
               <a:pPr/>
-              <a:t>9/14/2024</a:t>
+              <a:t>9/15/2024</a:t>
             </a:fld>
             <a:endParaRPr lang="en-US" dirty="0"/>
           </a:p>
@@ -4333,7 +4333,7 @@
             <a:fld id="{B61BEF0D-F0BB-DE4B-95CE-6DB70DBA9567}" type="datetimeFigureOut">
               <a:rPr lang="en-US" dirty="0"/>
               <a:pPr/>
-              <a:t>9/14/2024</a:t>
+              <a:t>9/15/2024</a:t>
             </a:fld>
             <a:endParaRPr lang="en-US" dirty="0"/>
           </a:p>
@@ -4663,7 +4663,7 @@
             <a:fld id="{B61BEF0D-F0BB-DE4B-95CE-6DB70DBA9567}" type="datetimeFigureOut">
               <a:rPr lang="en-US" dirty="0"/>
               <a:pPr/>
-              <a:t>9/14/2024</a:t>
+              <a:t>9/15/2024</a:t>
             </a:fld>
             <a:endParaRPr lang="en-US" dirty="0"/>
           </a:p>
@@ -5005,7 +5005,7 @@
             <a:fld id="{B61BEF0D-F0BB-DE4B-95CE-6DB70DBA9567}" type="datetimeFigureOut">
               <a:rPr lang="en-US" dirty="0"/>
               <a:pPr/>
-              <a:t>9/14/2024</a:t>
+              <a:t>9/15/2024</a:t>
             </a:fld>
             <a:endParaRPr lang="en-US" dirty="0"/>
           </a:p>
@@ -7119,7 +7119,7 @@
             <a:fld id="{B61BEF0D-F0BB-DE4B-95CE-6DB70DBA9567}" type="datetimeFigureOut">
               <a:rPr lang="en-US" dirty="0"/>
               <a:pPr/>
-              <a:t>9/14/2024</a:t>
+              <a:t>9/15/2024</a:t>
             </a:fld>
             <a:endParaRPr lang="en-US" dirty="0"/>
           </a:p>
@@ -8149,54 +8149,116 @@
             <p:ph type="title"/>
           </p:nvPr>
         </p:nvSpPr>
+        <p:spPr>
+          <a:xfrm>
+            <a:off x="2589212" y="446088"/>
+            <a:ext cx="2694617" cy="2982912"/>
+          </a:xfrm>
+        </p:spPr>
+        <p:txBody>
+          <a:bodyPr>
+            <a:normAutofit/>
+          </a:bodyPr>
+          <a:lstStyle/>
+          <a:p>
+            <a:r>
+              <a:rPr lang="es-CO" sz="2800" dirty="0" err="1"/>
+              <a:t>Class</a:t>
+            </a:r>
+            <a:r>
+              <a:rPr lang="es-CO" sz="2800" dirty="0"/>
+              <a:t> </a:t>
+            </a:r>
+            <a:r>
+              <a:rPr lang="es-CO" sz="2800" dirty="0" err="1"/>
+              <a:t>Model</a:t>
+            </a:r>
+            <a:r>
+              <a:rPr lang="es-CO" sz="2800" dirty="0"/>
+              <a:t> </a:t>
+            </a:r>
+            <a:r>
+              <a:rPr lang="es-CO" sz="2800" dirty="0" err="1"/>
+              <a:t>for</a:t>
+            </a:r>
+            <a:r>
+              <a:rPr lang="es-CO" sz="2800" dirty="0"/>
+              <a:t> </a:t>
+            </a:r>
+            <a:r>
+              <a:rPr lang="es-CO" sz="2800" dirty="0" err="1"/>
+              <a:t>add</a:t>
+            </a:r>
+            <a:r>
+              <a:rPr lang="es-CO" sz="2800" dirty="0"/>
+              <a:t> new Library </a:t>
+            </a:r>
+            <a:r>
+              <a:rPr lang="es-CO" sz="2800" dirty="0" err="1"/>
+              <a:t>Member</a:t>
+            </a:r>
+            <a:r>
+              <a:rPr lang="es-CO" sz="2800" dirty="0"/>
+              <a:t> use case</a:t>
+            </a:r>
+          </a:p>
+        </p:txBody>
+      </p:sp>
+      <p:sp>
+        <p:nvSpPr>
+          <p:cNvPr id="5" name="Marcador de contenido 4">
+            <a:extLst>
+              <a:ext uri="{FF2B5EF4-FFF2-40B4-BE49-F238E27FC236}">
+                <a16:creationId xmlns:a16="http://schemas.microsoft.com/office/drawing/2014/main" id="{1C64B499-8140-3FB2-F930-9998068EDEF7}"/>
+              </a:ext>
+            </a:extLst>
+          </p:cNvPr>
+          <p:cNvSpPr>
+            <a:spLocks noGrp="1"/>
+          </p:cNvSpPr>
+          <p:nvPr>
+            <p:ph idx="1"/>
+          </p:nvPr>
+        </p:nvSpPr>
         <p:spPr/>
         <p:txBody>
           <a:bodyPr/>
           <a:lstStyle/>
           <a:p>
-            <a:r>
-              <a:rPr lang="es-CO" dirty="0" err="1"/>
-              <a:t>Class</a:t>
-            </a:r>
-            <a:r>
-              <a:rPr lang="es-CO" dirty="0"/>
-              <a:t> </a:t>
-            </a:r>
-            <a:r>
-              <a:rPr lang="es-CO" dirty="0" err="1"/>
-              <a:t>Model</a:t>
-            </a:r>
-            <a:r>
-              <a:rPr lang="es-CO" dirty="0"/>
-              <a:t> </a:t>
-            </a:r>
-            <a:r>
-              <a:rPr lang="es-CO" dirty="0" err="1"/>
-              <a:t>for</a:t>
-            </a:r>
-            <a:r>
-              <a:rPr lang="es-CO" dirty="0"/>
-              <a:t> </a:t>
-            </a:r>
-            <a:r>
-              <a:rPr lang="es-CO" dirty="0" err="1"/>
-              <a:t>add</a:t>
-            </a:r>
-            <a:r>
-              <a:rPr lang="es-CO" dirty="0"/>
-              <a:t> new Library </a:t>
-            </a:r>
-            <a:r>
-              <a:rPr lang="es-CO" dirty="0" err="1"/>
-              <a:t>Member</a:t>
-            </a:r>
-            <a:r>
-              <a:rPr lang="es-CO" dirty="0"/>
-              <a:t> use case</a:t>
-            </a:r>
-          </a:p>
-        </p:txBody>
-      </p:sp>
+            <a:endParaRPr lang="es-CO"/>
+          </a:p>
+        </p:txBody>
+      </p:sp>
+      <p:pic>
+        <p:nvPicPr>
+          <p:cNvPr id="3" name="Imagen 2">
+            <a:extLst>
+              <a:ext uri="{FF2B5EF4-FFF2-40B4-BE49-F238E27FC236}">
+                <a16:creationId xmlns:a16="http://schemas.microsoft.com/office/drawing/2014/main" id="{89F0F5F8-0563-4412-B82E-13E86EAFF4C0}"/>
+              </a:ext>
+            </a:extLst>
+          </p:cNvPr>
+          <p:cNvPicPr>
+            <a:picLocks noChangeAspect="1"/>
+          </p:cNvPicPr>
+          <p:nvPr/>
+        </p:nvPicPr>
+        <p:blipFill>
+          <a:blip r:embed="rId2"/>
+          <a:stretch>
+            <a:fillRect/>
+          </a:stretch>
+        </p:blipFill>
+        <p:spPr>
+          <a:xfrm>
+            <a:off x="5283829" y="0"/>
+            <a:ext cx="6638794" cy="6858000"/>
+          </a:xfrm>
+          <a:prstGeom prst="rect">
+            <a:avLst/>
+          </a:prstGeom>
+        </p:spPr>
+      </p:pic>
     </p:spTree>
     <p:extLst>
       <p:ext uri="{BB962C8B-B14F-4D97-AF65-F5344CB8AC3E}">
@@ -8444,10 +8506,10 @@
       </p:sp>
       <p:pic>
         <p:nvPicPr>
-          <p:cNvPr id="4" name="Imagen 3" descr="Diagrama&#10;&#10;Descripción generada automáticamente con confianza media">
+          <p:cNvPr id="5" name="Imagen 4">
             <a:extLst>
               <a:ext uri="{FF2B5EF4-FFF2-40B4-BE49-F238E27FC236}">
-                <a16:creationId xmlns:a16="http://schemas.microsoft.com/office/drawing/2014/main" id="{2BB8A5CC-0EF7-59B8-4B83-7201B77BA48E}"/>
+                <a16:creationId xmlns:a16="http://schemas.microsoft.com/office/drawing/2014/main" id="{7FFDBFE2-0980-BBA4-111C-BF0C490D8A03}"/>
               </a:ext>
             </a:extLst>
           </p:cNvPr>
@@ -8464,8 +8526,8 @@
         </p:blipFill>
         <p:spPr>
           <a:xfrm>
-            <a:off x="1817718" y="0"/>
-            <a:ext cx="8987041" cy="5939666"/>
+            <a:off x="1627518" y="842601"/>
+            <a:ext cx="9202434" cy="5172797"/>
           </a:xfrm>
           <a:prstGeom prst="rect">
             <a:avLst/>
@@ -8573,10 +8635,10 @@
       </p:sp>
       <p:pic>
         <p:nvPicPr>
-          <p:cNvPr id="8" name="Imagen 7" descr="Diagrama&#10;&#10;Descripción generada automáticamente">
+          <p:cNvPr id="4" name="Imagen 3">
             <a:extLst>
               <a:ext uri="{FF2B5EF4-FFF2-40B4-BE49-F238E27FC236}">
-                <a16:creationId xmlns:a16="http://schemas.microsoft.com/office/drawing/2014/main" id="{4F117968-DF52-A85E-C24E-03BFD543FBAD}"/>
+                <a16:creationId xmlns:a16="http://schemas.microsoft.com/office/drawing/2014/main" id="{3DB49322-6DC3-5E36-425E-E05918B47B62}"/>
               </a:ext>
             </a:extLst>
           </p:cNvPr>
@@ -8593,8 +8655,8 @@
         </p:blipFill>
         <p:spPr>
           <a:xfrm>
-            <a:off x="1552340" y="0"/>
-            <a:ext cx="7607158" cy="5673134"/>
+            <a:off x="1570993" y="442453"/>
+            <a:ext cx="10066452" cy="5425288"/>
           </a:xfrm>
           <a:prstGeom prst="rect">
             <a:avLst/>
@@ -9001,23 +9063,7 @@
             </a:r>
             <a:r>
               <a:rPr lang="en-US" dirty="0"/>
-              <a:t>the best way to </a:t>
-            </a:r>
-            <a:r>
-              <a:rPr lang="en-US" dirty="0" err="1"/>
-              <a:t>achive</a:t>
-            </a:r>
-            <a:r>
-              <a:rPr lang="en-US" dirty="0"/>
-              <a:t> goals as a team is to define </a:t>
-            </a:r>
-            <a:r>
-              <a:rPr lang="en-US" dirty="0" err="1"/>
-              <a:t>propper</a:t>
-            </a:r>
-            <a:r>
-              <a:rPr lang="en-US" dirty="0"/>
-              <a:t> times to work, rest and personal things. </a:t>
+              <a:t>the best way to achieve goals as a team is to define proper times to work, rest and personal things. </a:t>
             </a:r>
           </a:p>
         </p:txBody>

</xml_diff>